<commit_message>
week 4 notes and project proposal
</commit_message>
<xml_diff>
--- a/Week 4 -- Spatial models theory/Lab/Lab 4 -- Spatial Models Theory.pptx
+++ b/Week 4 -- Spatial models theory/Lab/Lab 4 -- Spatial Models Theory.pptx
@@ -117,7 +117,18 @@
   </p:defaultTextStyle>
   <p:extLst>
     <p:ext uri="{EFAFB233-063F-42B5-8137-9DF3F51BA10A}">
-      <p15:sldGuideLst xmlns:p15="http://schemas.microsoft.com/office/powerpoint/2012/main" xmlns=""/>
+      <p15:sldGuideLst xmlns:p15="http://schemas.microsoft.com/office/powerpoint/2012/main">
+        <p15:guide id="1" orient="horz" pos="2160">
+          <p15:clr>
+            <a:srgbClr val="A4A3A4"/>
+          </p15:clr>
+        </p15:guide>
+        <p15:guide id="2" pos="2880">
+          <p15:clr>
+            <a:srgbClr val="A4A3A4"/>
+          </p15:clr>
+        </p15:guide>
+      </p15:sldGuideLst>
     </p:ext>
   </p:extLst>
 </p:presentation>
@@ -205,7 +216,7 @@
           <a:p>
             <a:fld id="{1522831B-4FE3-4D45-950B-0D2C6BB2DD76}" type="datetimeFigureOut">
               <a:rPr lang="en-US" smtClean="0"/>
-              <a:t>4/19/16</a:t>
+              <a:t>4/21/2016</a:t>
             </a:fld>
             <a:endParaRPr lang="en-US"/>
           </a:p>
@@ -473,6 +484,130 @@
 </p:notesMaster>
 </file>
 
+<file path=ppt/notesSlides/notesSlide1.xml><?xml version="1.0" encoding="utf-8"?>
+<p:notes xmlns:a="http://schemas.openxmlformats.org/drawingml/2006/main" xmlns:r="http://schemas.openxmlformats.org/officeDocument/2006/relationships" xmlns:p="http://schemas.openxmlformats.org/presentationml/2006/main">
+  <p:cSld>
+    <p:spTree>
+      <p:nvGrpSpPr>
+        <p:cNvPr id="1" name=""/>
+        <p:cNvGrpSpPr/>
+        <p:nvPr/>
+      </p:nvGrpSpPr>
+      <p:grpSpPr>
+        <a:xfrm>
+          <a:off x="0" y="0"/>
+          <a:ext cx="0" cy="0"/>
+          <a:chOff x="0" y="0"/>
+          <a:chExt cx="0" cy="0"/>
+        </a:xfrm>
+      </p:grpSpPr>
+      <p:sp>
+        <p:nvSpPr>
+          <p:cNvPr id="2" name="Slide Image Placeholder 1"/>
+          <p:cNvSpPr>
+            <a:spLocks noGrp="1" noRot="1" noChangeAspect="1"/>
+          </p:cNvSpPr>
+          <p:nvPr>
+            <p:ph type="sldImg"/>
+          </p:nvPr>
+        </p:nvSpPr>
+        <p:spPr/>
+      </p:sp>
+      <p:sp>
+        <p:nvSpPr>
+          <p:cNvPr id="3" name="Notes Placeholder 2"/>
+          <p:cNvSpPr>
+            <a:spLocks noGrp="1"/>
+          </p:cNvSpPr>
+          <p:nvPr>
+            <p:ph type="body" idx="1"/>
+          </p:nvPr>
+        </p:nvSpPr>
+        <p:spPr/>
+        <p:txBody>
+          <a:bodyPr/>
+          <a:lstStyle/>
+          <a:p>
+            <a:r>
+              <a:rPr lang="en-US" dirty="0" smtClean="0"/>
+              <a:t>Kriging – fit a </a:t>
+            </a:r>
+            <a:r>
+              <a:rPr lang="en-US" dirty="0" err="1" smtClean="0"/>
+              <a:t>semivariogram</a:t>
+            </a:r>
+            <a:r>
+              <a:rPr lang="en-US" dirty="0" smtClean="0"/>
+              <a:t>,</a:t>
+            </a:r>
+            <a:r>
+              <a:rPr lang="en-US" baseline="0" dirty="0" smtClean="0"/>
+              <a:t> fit a smoothing given the parameters you estimated previously</a:t>
+            </a:r>
+          </a:p>
+          <a:p>
+            <a:pPr marL="171450" indent="-171450">
+              <a:buFontTx/>
+              <a:buChar char="-"/>
+            </a:pPr>
+            <a:r>
+              <a:rPr lang="en-US" baseline="0" smtClean="0"/>
+              <a:t>Prediction </a:t>
+            </a:r>
+            <a:r>
+              <a:rPr lang="en-US" baseline="0" dirty="0" smtClean="0"/>
+              <a:t>of the surface given the parameters </a:t>
+            </a:r>
+            <a:r>
+              <a:rPr lang="en-US" baseline="0" smtClean="0"/>
+              <a:t>you estimated</a:t>
+            </a:r>
+          </a:p>
+          <a:p>
+            <a:pPr marL="171450" indent="-171450">
+              <a:buFontTx/>
+              <a:buChar char="-"/>
+            </a:pPr>
+            <a:endParaRPr lang="en-US"/>
+          </a:p>
+        </p:txBody>
+      </p:sp>
+      <p:sp>
+        <p:nvSpPr>
+          <p:cNvPr id="4" name="Slide Number Placeholder 3"/>
+          <p:cNvSpPr>
+            <a:spLocks noGrp="1"/>
+          </p:cNvSpPr>
+          <p:nvPr>
+            <p:ph type="sldNum" sz="quarter" idx="10"/>
+          </p:nvPr>
+        </p:nvSpPr>
+        <p:spPr/>
+        <p:txBody>
+          <a:bodyPr/>
+          <a:lstStyle/>
+          <a:p>
+            <a:fld id="{DCDC1745-AA19-4253-83E6-9EAE9D7EFFC9}" type="slidenum">
+              <a:rPr lang="en-US" smtClean="0"/>
+              <a:t>9</a:t>
+            </a:fld>
+            <a:endParaRPr lang="en-US"/>
+          </a:p>
+        </p:txBody>
+      </p:sp>
+    </p:spTree>
+    <p:extLst>
+      <p:ext uri="{BB962C8B-B14F-4D97-AF65-F5344CB8AC3E}">
+        <p14:creationId xmlns:p14="http://schemas.microsoft.com/office/powerpoint/2010/main" val="3897336945"/>
+      </p:ext>
+    </p:extLst>
+  </p:cSld>
+  <p:clrMapOvr>
+    <a:masterClrMapping/>
+  </p:clrMapOvr>
+</p:notes>
+</file>
+
 <file path=ppt/slideLayouts/slideLayout1.xml><?xml version="1.0" encoding="utf-8"?>
 <p:sldLayout xmlns:a="http://schemas.openxmlformats.org/drawingml/2006/main" xmlns:r="http://schemas.openxmlformats.org/officeDocument/2006/relationships" xmlns:p="http://schemas.openxmlformats.org/presentationml/2006/main" type="title" preserve="1">
   <p:cSld name="Title Slide">
@@ -699,7 +834,7 @@
   <p:timing>
     <p:tnLst>
       <p:par>
-        <p:cTn xmlns:p14="http://schemas.microsoft.com/office/powerpoint/2010/main" id="1" dur="indefinite" restart="never" nodeType="tmRoot"/>
+        <p:cTn id="1" dur="indefinite" restart="never" nodeType="tmRoot"/>
       </p:par>
     </p:tnLst>
   </p:timing>
@@ -1264,7 +1399,7 @@
   <p:timing>
     <p:tnLst>
       <p:par>
-        <p:cTn xmlns:p14="http://schemas.microsoft.com/office/powerpoint/2010/main" id="1" dur="indefinite" restart="never" nodeType="tmRoot"/>
+        <p:cTn id="1" dur="indefinite" restart="never" nodeType="tmRoot"/>
       </p:par>
     </p:tnLst>
   </p:timing>
@@ -3150,7 +3285,7 @@
   <p:timing>
     <p:tnLst>
       <p:par>
-        <p:cTn xmlns:p14="http://schemas.microsoft.com/office/powerpoint/2010/main" id="1" dur="indefinite" restart="never" nodeType="tmRoot"/>
+        <p:cTn id="1" dur="indefinite" restart="never" nodeType="tmRoot"/>
       </p:par>
     </p:tnLst>
   </p:timing>
@@ -3526,7 +3661,7 @@
   <p:timing>
     <p:tnLst>
       <p:par>
-        <p:cTn xmlns:p14="http://schemas.microsoft.com/office/powerpoint/2010/main" id="1" dur="indefinite" restart="never" nodeType="tmRoot"/>
+        <p:cTn id="1" dur="indefinite" restart="never" nodeType="tmRoot"/>
       </p:par>
     </p:tnLst>
   </p:timing>
@@ -3668,11 +3803,7 @@
             </a:pPr>
             <a:r>
               <a:rPr lang="en-US" dirty="0" smtClean="0"/>
-              <a:t>Estimate all components simultaneously as a 1-step </a:t>
-            </a:r>
-            <a:r>
-              <a:rPr lang="en-US" dirty="0" smtClean="0"/>
-              <a:t>process</a:t>
+              <a:t>Estimate all components simultaneously as a 1-step process</a:t>
             </a:r>
             <a:endParaRPr lang="en-US" dirty="0"/>
           </a:p>
@@ -3949,7 +4080,7 @@
   <p:timing>
     <p:tnLst>
       <p:par>
-        <p:cTn xmlns:p14="http://schemas.microsoft.com/office/powerpoint/2010/main" id="1" dur="indefinite" restart="never" nodeType="tmRoot"/>
+        <p:cTn id="1" dur="indefinite" restart="never" nodeType="tmRoot"/>
       </p:par>
     </p:tnLst>
   </p:timing>
@@ -4096,7 +4227,7 @@
   <p:timing>
     <p:tnLst>
       <p:par>
-        <p:cTn xmlns:p14="http://schemas.microsoft.com/office/powerpoint/2010/main" id="1" dur="indefinite" restart="never" nodeType="tmRoot"/>
+        <p:cTn id="1" dur="indefinite" restart="never" nodeType="tmRoot"/>
       </p:par>
     </p:tnLst>
   </p:timing>
@@ -4200,7 +4331,7 @@
   <p:timing>
     <p:tnLst>
       <p:par>
-        <p:cTn xmlns:p14="http://schemas.microsoft.com/office/powerpoint/2010/main" id="1" dur="indefinite" restart="never" nodeType="tmRoot"/>
+        <p:cTn id="1" dur="indefinite" restart="never" nodeType="tmRoot"/>
       </p:par>
     </p:tnLst>
   </p:timing>
@@ -4400,7 +4531,7 @@
   <p:timing>
     <p:tnLst>
       <p:par>
-        <p:cTn xmlns:p14="http://schemas.microsoft.com/office/powerpoint/2010/main" id="1" dur="indefinite" restart="never" nodeType="tmRoot"/>
+        <p:cTn id="1" dur="indefinite" restart="never" nodeType="tmRoot"/>
       </p:par>
     </p:tnLst>
   </p:timing>
@@ -4507,7 +4638,7 @@
   <p:timing>
     <p:tnLst>
       <p:par>
-        <p:cTn xmlns:p14="http://schemas.microsoft.com/office/powerpoint/2010/main" id="1" dur="indefinite" restart="never" nodeType="tmRoot"/>
+        <p:cTn id="1" dur="indefinite" restart="never" nodeType="tmRoot"/>
       </p:par>
     </p:tnLst>
   </p:timing>
@@ -4595,7 +4726,7 @@
           <p:nvPr/>
         </p:nvPicPr>
         <p:blipFill>
-          <a:blip r:embed="rId2"/>
+          <a:blip r:embed="rId3"/>
           <a:stretch>
             <a:fillRect/>
           </a:stretch>
@@ -4755,7 +4886,7 @@
   <p:timing>
     <p:tnLst>
       <p:par>
-        <p:cTn xmlns:p14="http://schemas.microsoft.com/office/powerpoint/2010/main" id="1" dur="indefinite" restart="never" nodeType="tmRoot"/>
+        <p:cTn id="1" dur="indefinite" restart="never" nodeType="tmRoot"/>
       </p:par>
     </p:tnLst>
   </p:timing>
@@ -5300,7 +5431,7 @@
   <a:extraClrSchemeLst/>
   <a:extLst>
     <a:ext uri="{05A4C25C-085E-4340-85A3-A5531E510DB2}">
-      <thm15:themeFamily xmlns:thm15="http://schemas.microsoft.com/office/thememl/2012/main" xmlns="" name="Office Theme" id="{62F939B6-93AF-4DB8-9C6B-D6C7DFDC589F}" vid="{4A3C46E8-61CC-4603-A589-7422A47A8E4A}"/>
+      <thm15:themeFamily xmlns:thm15="http://schemas.microsoft.com/office/thememl/2012/main" name="Office Theme" id="{62F939B6-93AF-4DB8-9C6B-D6C7DFDC589F}" vid="{4A3C46E8-61CC-4603-A589-7422A47A8E4A}"/>
     </a:ext>
   </a:extLst>
 </a:theme>

</xml_diff>